<commit_message>
Update API nomenclature for GitHub Pull Request
See https://github.com/sailuh/kaiaulu/pull/330/commits/67b72b288cde82807396ee541e0d2213f4d13ad3
</commit_message>
<xml_diff>
--- a/cheatsheets/github-comments-cheatsheet.pptx
+++ b/cheatsheets/github-comments-cheatsheet.pptx
@@ -2190,7 +2190,7 @@
           </a:ln>
           <a:extLst>
             <a:ext uri="{C572A759-6A51-4108-AA02-DFA0A04FC94B}">
-              <ma14:wrappingTextBoxFlag xmlns="" xmlns:m="http://schemas.openxmlformats.org/officeDocument/2006/math" xmlns:a14="http://schemas.microsoft.com/office/drawing/2010/main" xmlns:ma14="http://schemas.microsoft.com/office/mac/drawingml/2011/main" val="1"/>
+              <ma14:wrappingTextBoxFlag xmlns:ma14="http://schemas.microsoft.com/office/mac/drawingml/2011/main" xmlns:a14="http://schemas.microsoft.com/office/drawing/2010/main" xmlns:m="http://schemas.openxmlformats.org/officeDocument/2006/math" xmlns="" val="1"/>
             </a:ext>
           </a:extLst>
         </p:spPr>
@@ -2229,7 +2229,7 @@
           </a:ln>
           <a:extLst>
             <a:ext uri="{C572A759-6A51-4108-AA02-DFA0A04FC94B}">
-              <ma14:wrappingTextBoxFlag xmlns="" xmlns:m="http://schemas.openxmlformats.org/officeDocument/2006/math" xmlns:a14="http://schemas.microsoft.com/office/drawing/2010/main" xmlns:ma14="http://schemas.microsoft.com/office/mac/drawingml/2011/main" val="1"/>
+              <ma14:wrappingTextBoxFlag xmlns:ma14="http://schemas.microsoft.com/office/mac/drawingml/2011/main" xmlns:a14="http://schemas.microsoft.com/office/drawing/2010/main" xmlns:m="http://schemas.openxmlformats.org/officeDocument/2006/math" xmlns="" val="1"/>
             </a:ext>
           </a:extLst>
         </p:spPr>
@@ -3333,7 +3333,7 @@
           </a:ln>
           <a:extLst>
             <a:ext uri="{C572A759-6A51-4108-AA02-DFA0A04FC94B}">
-              <ma14:wrappingTextBoxFlag xmlns="" xmlns:m="http://schemas.openxmlformats.org/officeDocument/2006/math" xmlns:a14="http://schemas.microsoft.com/office/drawing/2010/main" xmlns:ma14="http://schemas.microsoft.com/office/mac/drawingml/2011/main" val="1"/>
+              <ma14:wrappingTextBoxFlag xmlns:ma14="http://schemas.microsoft.com/office/mac/drawingml/2011/main" xmlns:a14="http://schemas.microsoft.com/office/drawing/2010/main" xmlns:m="http://schemas.openxmlformats.org/officeDocument/2006/math" xmlns="" val="1"/>
             </a:ext>
           </a:extLst>
         </p:spPr>
@@ -3385,7 +3385,7 @@
           </a:ln>
           <a:extLst>
             <a:ext uri="{C572A759-6A51-4108-AA02-DFA0A04FC94B}">
-              <ma14:wrappingTextBoxFlag xmlns="" xmlns:m="http://schemas.openxmlformats.org/officeDocument/2006/math" xmlns:a14="http://schemas.microsoft.com/office/drawing/2010/main" xmlns:ma14="http://schemas.microsoft.com/office/mac/drawingml/2011/main" val="1"/>
+              <ma14:wrappingTextBoxFlag xmlns:ma14="http://schemas.microsoft.com/office/mac/drawingml/2011/main" xmlns:a14="http://schemas.microsoft.com/office/drawing/2010/main" xmlns:m="http://schemas.openxmlformats.org/officeDocument/2006/math" xmlns="" val="1"/>
             </a:ext>
           </a:extLst>
         </p:spPr>
@@ -3483,7 +3483,7 @@
           </a:ln>
           <a:extLst>
             <a:ext uri="{C572A759-6A51-4108-AA02-DFA0A04FC94B}">
-              <ma14:wrappingTextBoxFlag xmlns="" xmlns:m="http://schemas.openxmlformats.org/officeDocument/2006/math" xmlns:a14="http://schemas.microsoft.com/office/drawing/2010/main" xmlns:ma14="http://schemas.microsoft.com/office/mac/drawingml/2011/main" val="1"/>
+              <ma14:wrappingTextBoxFlag xmlns:ma14="http://schemas.microsoft.com/office/mac/drawingml/2011/main" xmlns:a14="http://schemas.microsoft.com/office/drawing/2010/main" xmlns:m="http://schemas.openxmlformats.org/officeDocument/2006/math" xmlns="" val="1"/>
             </a:ext>
           </a:extLst>
         </p:spPr>
@@ -3583,7 +3583,7 @@
           </a:ln>
           <a:extLst>
             <a:ext uri="{C572A759-6A51-4108-AA02-DFA0A04FC94B}">
-              <ma14:wrappingTextBoxFlag xmlns="" xmlns:m="http://schemas.openxmlformats.org/officeDocument/2006/math" xmlns:a14="http://schemas.microsoft.com/office/drawing/2010/main" xmlns:ma14="http://schemas.microsoft.com/office/mac/drawingml/2011/main" val="1"/>
+              <ma14:wrappingTextBoxFlag xmlns:ma14="http://schemas.microsoft.com/office/mac/drawingml/2011/main" xmlns:a14="http://schemas.microsoft.com/office/drawing/2010/main" xmlns:m="http://schemas.openxmlformats.org/officeDocument/2006/math" xmlns="" val="1"/>
             </a:ext>
           </a:extLst>
         </p:spPr>
@@ -3647,7 +3647,7 @@
           </a:ln>
           <a:extLst>
             <a:ext uri="{C572A759-6A51-4108-AA02-DFA0A04FC94B}">
-              <ma14:wrappingTextBoxFlag xmlns="" xmlns:m="http://schemas.openxmlformats.org/officeDocument/2006/math" xmlns:a14="http://schemas.microsoft.com/office/drawing/2010/main" xmlns:ma14="http://schemas.microsoft.com/office/mac/drawingml/2011/main" val="1"/>
+              <ma14:wrappingTextBoxFlag xmlns:ma14="http://schemas.microsoft.com/office/mac/drawingml/2011/main" xmlns:a14="http://schemas.microsoft.com/office/drawing/2010/main" xmlns:m="http://schemas.openxmlformats.org/officeDocument/2006/math" xmlns="" val="1"/>
             </a:ext>
           </a:extLst>
         </p:spPr>
@@ -3910,7 +3910,7 @@
           </a:ln>
           <a:extLst>
             <a:ext uri="{C572A759-6A51-4108-AA02-DFA0A04FC94B}">
-              <ma14:wrappingTextBoxFlag xmlns="" xmlns:m="http://schemas.openxmlformats.org/officeDocument/2006/math" xmlns:a14="http://schemas.microsoft.com/office/drawing/2010/main" xmlns:ma14="http://schemas.microsoft.com/office/mac/drawingml/2011/main" val="1"/>
+              <ma14:wrappingTextBoxFlag xmlns:ma14="http://schemas.microsoft.com/office/mac/drawingml/2011/main" xmlns:a14="http://schemas.microsoft.com/office/drawing/2010/main" xmlns:m="http://schemas.openxmlformats.org/officeDocument/2006/math" xmlns="" val="1"/>
             </a:ext>
           </a:extLst>
         </p:spPr>
@@ -3954,7 +3954,7 @@
         </p:nvSpPr>
         <p:spPr>
           <a:xfrm>
-            <a:off x="9582328" y="3621491"/>
+            <a:off x="9582328" y="3621492"/>
             <a:ext cx="4177348" cy="3623988"/>
           </a:xfrm>
           <a:prstGeom prst="rect">
@@ -4051,7 +4051,15 @@
             </a:pPr>
             <a:r>
               <a:rPr lang="en-US" sz="1300" dirty="0"/>
-              <a:t>3. github_api_pr_reviews_refresh()</a:t>
+              <a:t>3. </a:t>
+            </a:r>
+            <a:r>
+              <a:rPr lang="en-US" sz="1300" dirty="0" err="1"/>
+              <a:t>github_api_project_pull_request_review_refresh</a:t>
+            </a:r>
+            <a:r>
+              <a:rPr lang="en-US" sz="1300" dirty="0"/>
+              <a:t>()</a:t>
             </a:r>
           </a:p>
           <a:p>
@@ -4098,12 +4106,20 @@
           <a:p>
             <a:r>
               <a:rPr lang="en-US" sz="1300" dirty="0"/>
-              <a:t>4. github_api_project_pr_comments_refresh()</a:t>
+              <a:t>4. </a:t>
             </a:r>
-          </a:p>
-          <a:p>
             <a:r>
-              <a:rPr lang="en-US" sz="1200" b="0" dirty="0"/>
+              <a:rPr lang="en-US" sz="1100" dirty="0" err="1"/>
+              <a:t>github_api_project_pull_request_inline_comments_refresh</a:t>
+            </a:r>
+            <a:r>
+              <a:rPr lang="en-US" sz="1100" dirty="0"/>
+              <a:t>()</a:t>
+            </a:r>
+          </a:p>
+          <a:p>
+            <a:r>
+              <a:rPr lang="en-US" b="0" dirty="0"/>
               <a:t>In-line code comments may also be added without a change request comment. </a:t>
             </a:r>
           </a:p>
@@ -4128,7 +4144,7 @@
           </a:ln>
           <a:extLst>
             <a:ext uri="{C572A759-6A51-4108-AA02-DFA0A04FC94B}">
-              <ma14:wrappingTextBoxFlag xmlns="" xmlns:m="http://schemas.openxmlformats.org/officeDocument/2006/math" xmlns:a14="http://schemas.microsoft.com/office/drawing/2010/main" xmlns:ma14="http://schemas.microsoft.com/office/mac/drawingml/2011/main" val="1"/>
+              <ma14:wrappingTextBoxFlag xmlns:ma14="http://schemas.microsoft.com/office/mac/drawingml/2011/main" xmlns:a14="http://schemas.microsoft.com/office/drawing/2010/main" xmlns:m="http://schemas.openxmlformats.org/officeDocument/2006/math" xmlns="" val="1"/>
             </a:ext>
           </a:extLst>
         </p:spPr>
@@ -4979,7 +4995,7 @@
           </a:ln>
           <a:extLst>
             <a:ext uri="{C572A759-6A51-4108-AA02-DFA0A04FC94B}">
-              <ma14:wrappingTextBoxFlag xmlns:lc="http://schemas.openxmlformats.org/drawingml/2006/lockedCanvas" xmlns="" xmlns:m="http://schemas.openxmlformats.org/officeDocument/2006/math" xmlns:a14="http://schemas.microsoft.com/office/drawing/2010/main" xmlns:ma14="http://schemas.microsoft.com/office/mac/drawingml/2011/main" val="1"/>
+              <ma14:wrappingTextBoxFlag xmlns:ma14="http://schemas.microsoft.com/office/mac/drawingml/2011/main" xmlns:a14="http://schemas.microsoft.com/office/drawing/2010/main" xmlns:m="http://schemas.openxmlformats.org/officeDocument/2006/math" xmlns="" xmlns:lc="http://schemas.openxmlformats.org/drawingml/2006/lockedCanvas" val="1"/>
             </a:ext>
           </a:extLst>
         </p:spPr>
@@ -5332,7 +5348,7 @@
           </a:ln>
           <a:extLst>
             <a:ext uri="{C572A759-6A51-4108-AA02-DFA0A04FC94B}">
-              <ma14:wrappingTextBoxFlag xmlns:lc="http://schemas.openxmlformats.org/drawingml/2006/lockedCanvas" xmlns="" xmlns:m="http://schemas.openxmlformats.org/officeDocument/2006/math" xmlns:a14="http://schemas.microsoft.com/office/drawing/2010/main" xmlns:ma14="http://schemas.microsoft.com/office/mac/drawingml/2011/main" val="1"/>
+              <ma14:wrappingTextBoxFlag xmlns:ma14="http://schemas.microsoft.com/office/mac/drawingml/2011/main" xmlns:a14="http://schemas.microsoft.com/office/drawing/2010/main" xmlns:m="http://schemas.openxmlformats.org/officeDocument/2006/math" xmlns="" xmlns:lc="http://schemas.openxmlformats.org/drawingml/2006/lockedCanvas" val="1"/>
             </a:ext>
           </a:extLst>
         </p:spPr>
@@ -5698,7 +5714,7 @@
           </a:ln>
           <a:extLst>
             <a:ext uri="{C572A759-6A51-4108-AA02-DFA0A04FC94B}">
-              <ma14:wrappingTextBoxFlag xmlns:lc="http://schemas.openxmlformats.org/drawingml/2006/lockedCanvas" xmlns="" xmlns:m="http://schemas.openxmlformats.org/officeDocument/2006/math" xmlns:a14="http://schemas.microsoft.com/office/drawing/2010/main" xmlns:ma14="http://schemas.microsoft.com/office/mac/drawingml/2011/main" val="1"/>
+              <ma14:wrappingTextBoxFlag xmlns:ma14="http://schemas.microsoft.com/office/mac/drawingml/2011/main" xmlns:a14="http://schemas.microsoft.com/office/drawing/2010/main" xmlns:m="http://schemas.openxmlformats.org/officeDocument/2006/math" xmlns="" xmlns:lc="http://schemas.openxmlformats.org/drawingml/2006/lockedCanvas" val="1"/>
             </a:ext>
           </a:extLst>
         </p:spPr>
@@ -6182,7 +6198,7 @@
           </a:ln>
           <a:extLst>
             <a:ext uri="{C572A759-6A51-4108-AA02-DFA0A04FC94B}">
-              <ma14:wrappingTextBoxFlag xmlns:lc="http://schemas.openxmlformats.org/drawingml/2006/lockedCanvas" xmlns="" xmlns:m="http://schemas.openxmlformats.org/officeDocument/2006/math" xmlns:a14="http://schemas.microsoft.com/office/drawing/2010/main" xmlns:ma14="http://schemas.microsoft.com/office/mac/drawingml/2011/main" val="1"/>
+              <ma14:wrappingTextBoxFlag xmlns:ma14="http://schemas.microsoft.com/office/mac/drawingml/2011/main" xmlns:a14="http://schemas.microsoft.com/office/drawing/2010/main" xmlns:m="http://schemas.openxmlformats.org/officeDocument/2006/math" xmlns="" xmlns:lc="http://schemas.openxmlformats.org/drawingml/2006/lockedCanvas" val="1"/>
             </a:ext>
           </a:extLst>
         </p:spPr>
@@ -6894,7 +6910,7 @@
           </a:ln>
           <a:extLst>
             <a:ext uri="{C572A759-6A51-4108-AA02-DFA0A04FC94B}">
-              <ma14:wrappingTextBoxFlag xmlns="" xmlns:m="http://schemas.openxmlformats.org/officeDocument/2006/math" xmlns:a14="http://schemas.microsoft.com/office/drawing/2010/main" xmlns:ma14="http://schemas.microsoft.com/office/mac/drawingml/2011/main" val="1"/>
+              <ma14:wrappingTextBoxFlag xmlns:ma14="http://schemas.microsoft.com/office/mac/drawingml/2011/main" xmlns:a14="http://schemas.microsoft.com/office/drawing/2010/main" xmlns:m="http://schemas.openxmlformats.org/officeDocument/2006/math" xmlns="" val="1"/>
             </a:ext>
           </a:extLst>
         </p:spPr>
@@ -7042,7 +7058,7 @@
           </a:ln>
           <a:extLst>
             <a:ext uri="{C572A759-6A51-4108-AA02-DFA0A04FC94B}">
-              <ma14:wrappingTextBoxFlag xmlns="" xmlns:m="http://schemas.openxmlformats.org/officeDocument/2006/math" xmlns:a14="http://schemas.microsoft.com/office/drawing/2010/main" xmlns:ma14="http://schemas.microsoft.com/office/mac/drawingml/2011/main" val="1"/>
+              <ma14:wrappingTextBoxFlag xmlns:ma14="http://schemas.microsoft.com/office/mac/drawingml/2011/main" xmlns:a14="http://schemas.microsoft.com/office/drawing/2010/main" xmlns:m="http://schemas.openxmlformats.org/officeDocument/2006/math" xmlns="" val="1"/>
             </a:ext>
           </a:extLst>
         </p:spPr>

</xml_diff>

<commit_message>
Review PR parser function nomenclature
</commit_message>
<xml_diff>
--- a/cheatsheets/github-comments-cheatsheet.pptx
+++ b/cheatsheets/github-comments-cheatsheet.pptx
@@ -3472,7 +3472,7 @@
         </p:nvSpPr>
         <p:spPr>
           <a:xfrm>
-            <a:off x="155122" y="1733067"/>
+            <a:off x="155448" y="1733067"/>
             <a:ext cx="3949153" cy="1145874"/>
           </a:xfrm>
           <a:prstGeom prst="rect">
@@ -3636,7 +3636,7 @@
         </p:nvSpPr>
         <p:spPr>
           <a:xfrm>
-            <a:off x="275721" y="1453227"/>
+            <a:off x="146304" y="1453227"/>
             <a:ext cx="2621281" cy="340029"/>
           </a:xfrm>
           <a:prstGeom prst="rect">
@@ -4133,7 +4133,7 @@
         </p:nvSpPr>
         <p:spPr>
           <a:xfrm>
-            <a:off x="148894" y="5970177"/>
+            <a:off x="146304" y="5970177"/>
             <a:ext cx="3973845" cy="340029"/>
           </a:xfrm>
           <a:prstGeom prst="rect">
@@ -4188,7 +4188,7 @@
         </p:nvSpPr>
         <p:spPr>
           <a:xfrm>
-            <a:off x="158709" y="6525639"/>
+            <a:off x="155448" y="6525639"/>
             <a:ext cx="4184378" cy="2900713"/>
           </a:xfrm>
           <a:prstGeom prst="rect">
@@ -7047,7 +7047,7 @@
         </p:nvSpPr>
         <p:spPr>
           <a:xfrm>
-            <a:off x="4496162" y="1426182"/>
+            <a:off x="4819606" y="1426182"/>
             <a:ext cx="3685304" cy="340029"/>
           </a:xfrm>
           <a:prstGeom prst="rect">
@@ -7905,7 +7905,7 @@
         </p:nvSpPr>
         <p:spPr>
           <a:xfrm>
-            <a:off x="4854439" y="1932965"/>
+            <a:off x="4855464" y="1932965"/>
             <a:ext cx="4335115" cy="7314185"/>
           </a:xfrm>
           <a:prstGeom prst="rect">
@@ -14881,8 +14881,8 @@
         </p:nvSpPr>
         <p:spPr>
           <a:xfrm>
-            <a:off x="9601060" y="8202421"/>
-            <a:ext cx="4177348" cy="1736292"/>
+            <a:off x="9601060" y="8189425"/>
+            <a:ext cx="4177348" cy="2013291"/>
           </a:xfrm>
           <a:prstGeom prst="rect">
             <a:avLst/>
@@ -14915,83 +14915,71 @@
           <a:p>
             <a:r>
               <a:rPr lang="en-US" sz="1400" dirty="0"/>
-              <a:t>1. github_parse_project_pr_reviews()</a:t>
+              <a:t>1. </a:t>
             </a:r>
-          </a:p>
-          <a:p>
-            <a:pPr marL="0" marR="0" indent="0" algn="l" defTabSz="584200" rtl="0" fontAlgn="auto" latinLnBrk="0" hangingPunct="0">
-              <a:lnSpc>
-                <a:spcPct val="100000"/>
-              </a:lnSpc>
-              <a:spcBef>
-                <a:spcPts val="200"/>
-              </a:spcBef>
-              <a:spcAft>
-                <a:spcPts val="0"/>
-              </a:spcAft>
-              <a:buClrTx/>
-              <a:buSzTx/>
-              <a:buFontTx/>
-              <a:buNone/>
-              <a:tabLst/>
-            </a:pPr>
-            <a:endParaRPr lang="en-US" dirty="0"/>
-          </a:p>
-          <a:p>
+            <a:r>
+              <a:rPr lang="en-US" sz="1400" dirty="0" err="1"/>
+              <a:t>github_parse_project_pull_request</a:t>
+            </a:r>
             <a:r>
               <a:rPr lang="en-US" sz="1400" dirty="0"/>
-              <a:t>2. github_parse_project_issue_or_pr_comments()</a:t>
+              <a:t>()</a:t>
             </a:r>
           </a:p>
           <a:p>
             <a:endParaRPr lang="en-US" sz="1400" dirty="0"/>
           </a:p>
           <a:p>
-            <a:pPr marL="0" marR="0" indent="0" algn="l" defTabSz="584200" rtl="0" fontAlgn="auto" latinLnBrk="0" hangingPunct="0">
-              <a:lnSpc>
-                <a:spcPct val="100000"/>
-              </a:lnSpc>
-              <a:spcBef>
-                <a:spcPts val="200"/>
-              </a:spcBef>
-              <a:spcAft>
-                <a:spcPts val="0"/>
-              </a:spcAft>
-              <a:buClrTx/>
-              <a:buSzTx/>
-              <a:buFontTx/>
-              <a:buNone/>
-              <a:tabLst/>
-            </a:pPr>
             <a:r>
               <a:rPr lang="en-US" sz="1400" dirty="0"/>
-              <a:t>3. github_parse_project_pr_comments()</a:t>
+              <a:t>2. </a:t>
             </a:r>
-          </a:p>
-          <a:p>
-            <a:pPr marL="0" marR="0" indent="0" algn="l" defTabSz="584200" rtl="0" fontAlgn="auto" latinLnBrk="0" hangingPunct="0">
-              <a:lnSpc>
-                <a:spcPct val="100000"/>
-              </a:lnSpc>
-              <a:spcBef>
-                <a:spcPts val="200"/>
-              </a:spcBef>
-              <a:spcAft>
-                <a:spcPts val="0"/>
-              </a:spcAft>
-              <a:buClrTx/>
-              <a:buSzTx/>
-              <a:buFontTx/>
-              <a:buNone/>
-              <a:tabLst/>
-            </a:pPr>
-            <a:endParaRPr lang="en-US" b="0" dirty="0"/>
-          </a:p>
-          <a:p>
+            <a:r>
+              <a:rPr lang="en-US" sz="1400" dirty="0" err="1"/>
+              <a:t>github_parse_project_issue_or_pr_comments</a:t>
+            </a:r>
             <a:r>
               <a:rPr lang="en-US" sz="1400" dirty="0"/>
-              <a:t>4. github_parse_project_pull_request()</a:t>
+              <a:t>()</a:t>
             </a:r>
+          </a:p>
+          <a:p>
+            <a:endParaRPr lang="en-US" sz="1400" dirty="0"/>
+          </a:p>
+          <a:p>
+            <a:r>
+              <a:rPr lang="en-US" sz="1400" dirty="0"/>
+              <a:t>3. </a:t>
+            </a:r>
+            <a:r>
+              <a:rPr lang="en-US" sz="1400" dirty="0" err="1"/>
+              <a:t>github_parse_project_pull_request_reviews</a:t>
+            </a:r>
+            <a:r>
+              <a:rPr lang="en-US" sz="1400" dirty="0"/>
+              <a:t>()</a:t>
+            </a:r>
+            <a:br>
+              <a:rPr lang="en-US" sz="1400" dirty="0"/>
+            </a:br>
+            <a:endParaRPr lang="en-US" sz="1400" dirty="0"/>
+          </a:p>
+          <a:p>
+            <a:r>
+              <a:rPr lang="en-US" sz="1400" dirty="0"/>
+              <a:t>4. </a:t>
+            </a:r>
+            <a:r>
+              <a:rPr lang="en-US" dirty="0" err="1"/>
+              <a:t>github_parse_project_pull_request_inline_comments</a:t>
+            </a:r>
+            <a:r>
+              <a:rPr lang="en-US" dirty="0"/>
+              <a:t>()</a:t>
+            </a:r>
+          </a:p>
+          <a:p>
+            <a:endParaRPr lang="en-US" sz="1400" dirty="0"/>
           </a:p>
         </p:txBody>
       </p:sp>

</xml_diff>